<commit_message>
Um, idk what the github will do with mp4
</commit_message>
<xml_diff>
--- a/ADS Exercise 2/CS Sorting Video.pptx
+++ b/ADS Exercise 2/CS Sorting Video.pptx
@@ -135,6 +135,11 @@
       </a:defRPr>
     </a:lvl9pPr>
   </p:defaultTextStyle>
+  <p:extLst>
+    <p:ext uri="{EFAFB233-063F-42B5-8137-9DF3F51BA10A}">
+      <p15:sldGuideLst xmlns:p15="http://schemas.microsoft.com/office/powerpoint/2012/main"/>
+    </p:ext>
+  </p:extLst>
 </p:presentation>
 </file>
 
@@ -301,7 +306,7 @@
           <a:p>
             <a:fld id="{1160EA64-D806-43AC-9DF2-F8C432F32B4C}" type="datetimeFigureOut">
               <a:rPr lang="en-US" dirty="0"/>
-              <a:t>10/23/18</a:t>
+              <a:t>10/27/2018</a:t>
             </a:fld>
             <a:endParaRPr lang="en-US" dirty="0"/>
           </a:p>
@@ -467,7 +472,7 @@
           <a:p>
             <a:fld id="{E9F9C37B-1D36-470B-8223-D6C91242EC14}" type="datetimeFigureOut">
               <a:rPr lang="en-US" dirty="0"/>
-              <a:t>10/23/18</a:t>
+              <a:t>10/27/2018</a:t>
             </a:fld>
             <a:endParaRPr lang="en-US" dirty="0"/>
           </a:p>
@@ -642,7 +647,7 @@
           <a:p>
             <a:fld id="{67C6F52A-A82B-47A2-A83A-8C4C91F2D59F}" type="datetimeFigureOut">
               <a:rPr lang="en-US" dirty="0"/>
-              <a:t>10/23/18</a:t>
+              <a:t>10/27/2018</a:t>
             </a:fld>
             <a:endParaRPr lang="en-US" dirty="0"/>
           </a:p>
@@ -807,7 +812,7 @@
           <a:p>
             <a:fld id="{F070A7B3-6521-4DCA-87E5-044747A908C1}" type="datetimeFigureOut">
               <a:rPr lang="en-US" dirty="0"/>
-              <a:t>10/23/18</a:t>
+              <a:t>10/27/2018</a:t>
             </a:fld>
             <a:endParaRPr lang="en-US" dirty="0"/>
           </a:p>
@@ -1071,7 +1076,7 @@
           <a:p>
             <a:fld id="{1160EA64-D806-43AC-9DF2-F8C432F32B4C}" type="datetimeFigureOut">
               <a:rPr lang="en-US" dirty="0"/>
-              <a:t>10/23/18</a:t>
+              <a:t>10/27/2018</a:t>
             </a:fld>
             <a:endParaRPr lang="en-US" dirty="0"/>
           </a:p>
@@ -1299,7 +1304,7 @@
           <a:p>
             <a:fld id="{AB134690-1557-4C89-A502-4959FE7FAD70}" type="datetimeFigureOut">
               <a:rPr lang="en-US" dirty="0"/>
-              <a:t>10/23/18</a:t>
+              <a:t>10/27/2018</a:t>
             </a:fld>
             <a:endParaRPr lang="en-US" dirty="0"/>
           </a:p>
@@ -1653,7 +1658,7 @@
           <a:p>
             <a:fld id="{4F7D4976-E339-4826-83B7-FBD03F55ECF8}" type="datetimeFigureOut">
               <a:rPr lang="en-US" dirty="0"/>
-              <a:t>10/23/18</a:t>
+              <a:t>10/27/2018</a:t>
             </a:fld>
             <a:endParaRPr lang="en-US" dirty="0"/>
           </a:p>
@@ -1789,7 +1794,7 @@
           <a:p>
             <a:fld id="{E1037C31-9E7A-4F99-8774-A0E530DE1A42}" type="datetimeFigureOut">
               <a:rPr lang="en-US" dirty="0"/>
-              <a:t>10/23/18</a:t>
+              <a:t>10/27/2018</a:t>
             </a:fld>
             <a:endParaRPr lang="en-US" dirty="0"/>
           </a:p>
@@ -1879,7 +1884,7 @@
           <a:p>
             <a:fld id="{C278504F-A551-4DE0-9316-4DCD1D8CC752}" type="datetimeFigureOut">
               <a:rPr lang="en-US" dirty="0"/>
-              <a:t>10/23/18</a:t>
+              <a:t>10/27/2018</a:t>
             </a:fld>
             <a:endParaRPr lang="en-US" dirty="0"/>
           </a:p>
@@ -2231,7 +2236,7 @@
           <a:p>
             <a:fld id="{D1BE4249-C0D0-4B06-8692-E8BB871AF643}" type="datetimeFigureOut">
               <a:rPr lang="en-US" dirty="0"/>
-              <a:t>10/23/18</a:t>
+              <a:t>10/27/2018</a:t>
             </a:fld>
             <a:endParaRPr lang="en-US" dirty="0"/>
           </a:p>
@@ -2583,7 +2588,7 @@
           <a:p>
             <a:fld id="{042B0DB6-F5C7-45FB-8CF3-31B45F9C2DAC}" type="datetimeFigureOut">
               <a:rPr lang="en-US" dirty="0"/>
-              <a:t>10/23/18</a:t>
+              <a:t>10/27/2018</a:t>
             </a:fld>
             <a:endParaRPr lang="en-US" dirty="0"/>
           </a:p>
@@ -2819,7 +2824,7 @@
           <a:p>
             <a:fld id="{1160EA64-D806-43AC-9DF2-F8C432F32B4C}" type="datetimeFigureOut">
               <a:rPr lang="en-US" dirty="0"/>
-              <a:t>10/23/18</a:t>
+              <a:t>10/27/2018</a:t>
             </a:fld>
             <a:endParaRPr lang="en-US" dirty="0"/>
           </a:p>
@@ -3325,21 +3330,8 @@
           <a:p>
             <a:r>
               <a:rPr lang="en-US" dirty="0"/>
-              <a:t>by </a:t>
+              <a:t>by Kaan Kayaalp and Sujay Swain</a:t>
             </a:r>
-            <a:r>
-              <a:rPr lang="en-US" dirty="0" err="1"/>
-              <a:t>Kaan</a:t>
-            </a:r>
-            <a:r>
-              <a:rPr lang="en-US" dirty="0"/>
-              <a:t> </a:t>
-            </a:r>
-            <a:r>
-              <a:rPr lang="en-US" dirty="0" err="1"/>
-              <a:t>Kayaalp</a:t>
-            </a:r>
-            <a:endParaRPr lang="en-US" dirty="0"/>
           </a:p>
         </p:txBody>
       </p:sp>

</xml_diff>